<commit_message>
added workflow sharing example
</commit_message>
<xml_diff>
--- a/doc/slides/day4/session3/RunningWorkflows.pptx
+++ b/doc/slides/day4/session3/RunningWorkflows.pptx
@@ -16,6 +16,7 @@
     <p:sldId id="259" r:id="rId9"/>
     <p:sldId id="260" r:id="rId10"/>
     <p:sldId id="261" r:id="rId11"/>
+    <p:sldId id="262" r:id="rId12"/>
   </p:sldIdLst>
   <p:sldSz cx="9144000" cy="6858000"/>
   <p:notesSz cx="6858000" cy="9144000"/>
@@ -183,7 +184,7 @@
           <a:bodyPr anchor="b" bIns="0" lIns="0" rIns="0" tIns="0" wrap="none"/>
           <a:p>
             <a:pPr algn="r"/>
-            <a:fld id="{A11141E1-4171-41B1-A141-C1D161311161}" type="slidenum">
+            <a:fld id="{81D181D1-C191-41D1-B1C1-A1E111D11111}" type="slidenum">
               <a:rPr lang="en-US"/>
               <a:t>&lt;number&gt;</a:t>
             </a:fld>
@@ -216,7 +217,7 @@
       </p:grpSpPr>
       <p:sp>
         <p:nvSpPr>
-          <p:cNvPr id="124" name="PlaceHolder 1"/>
+          <p:cNvPr id="127" name="PlaceHolder 1"/>
           <p:cNvSpPr>
             <a:spLocks noGrp="1"/>
           </p:cNvSpPr>
@@ -227,7 +228,7 @@
         <p:spPr>
           <a:xfrm>
             <a:off x="0" y="0"/>
-            <a:ext cx="11793240" cy="11793240"/>
+            <a:ext cx="11792520" cy="11792520"/>
           </a:xfrm>
           <a:prstGeom prst="rect">
             <a:avLst/>
@@ -246,14 +247,14 @@
       </p:sp>
       <p:sp>
         <p:nvSpPr>
-          <p:cNvPr id="125" name="CustomShape 2"/>
+          <p:cNvPr id="128" name="CustomShape 2"/>
           <p:cNvSpPr/>
           <p:nvPr/>
         </p:nvSpPr>
         <p:spPr>
           <a:xfrm>
             <a:off x="0" y="0"/>
-            <a:ext cx="11793240" cy="11793240"/>
+            <a:ext cx="11792520" cy="11792520"/>
           </a:xfrm>
           <a:prstGeom prst="rect">
             <a:avLst/>
@@ -267,7 +268,7 @@
                 <a:spcPct val="100000"/>
               </a:lnSpc>
             </a:pPr>
-            <a:fld id="{B141C151-61E1-4141-8191-F181F141B181}" type="slidenum">
+            <a:fld id="{A171E151-61C1-4171-9101-5141F111D161}" type="slidenum">
               <a:rPr lang="en-US">
                 <a:solidFill>
                   <a:srgbClr val="000000"/>
@@ -338,7 +339,7 @@
         <p:spPr>
           <a:xfrm>
             <a:off x="457200" y="274680"/>
-            <a:ext cx="8225640" cy="1143000"/>
+            <a:ext cx="8224920" cy="1143000"/>
           </a:xfrm>
           <a:prstGeom prst="rect">
             <a:avLst/>
@@ -365,7 +366,7 @@
         <p:spPr>
           <a:xfrm>
             <a:off x="457200" y="1600200"/>
-            <a:ext cx="5040" cy="2156760"/>
+            <a:ext cx="360" cy="2156400"/>
           </a:xfrm>
           <a:prstGeom prst="rect">
             <a:avLst/>
@@ -390,8 +391,8 @@
         </p:nvSpPr>
         <p:spPr>
           <a:xfrm>
-            <a:off x="457200" y="3962160"/>
-            <a:ext cx="5040" cy="2156760"/>
+            <a:off x="457200" y="3961800"/>
+            <a:ext cx="360" cy="2156400"/>
           </a:xfrm>
           <a:prstGeom prst="rect">
             <a:avLst/>
@@ -439,7 +440,7 @@
         <p:spPr>
           <a:xfrm>
             <a:off x="457200" y="274680"/>
-            <a:ext cx="8225640" cy="1143000"/>
+            <a:ext cx="8224920" cy="1143000"/>
           </a:xfrm>
           <a:prstGeom prst="rect">
             <a:avLst/>
@@ -466,7 +467,7 @@
         <p:spPr>
           <a:xfrm>
             <a:off x="457200" y="1600200"/>
-            <a:ext cx="2160" cy="2156760"/>
+            <a:ext cx="-12254040" cy="2156400"/>
           </a:xfrm>
           <a:prstGeom prst="rect">
             <a:avLst/>
@@ -491,8 +492,8 @@
         </p:nvSpPr>
         <p:spPr>
           <a:xfrm>
-            <a:off x="459720" y="1600200"/>
-            <a:ext cx="2160" cy="2156760"/>
+            <a:off x="457200" y="1600200"/>
+            <a:ext cx="-12254040" cy="2156400"/>
           </a:xfrm>
           <a:prstGeom prst="rect">
             <a:avLst/>
@@ -517,8 +518,8 @@
         </p:nvSpPr>
         <p:spPr>
           <a:xfrm>
-            <a:off x="459720" y="3962160"/>
-            <a:ext cx="2160" cy="2156760"/>
+            <a:off x="457200" y="3961800"/>
+            <a:ext cx="-12254040" cy="2156400"/>
           </a:xfrm>
           <a:prstGeom prst="rect">
             <a:avLst/>
@@ -543,8 +544,8 @@
         </p:nvSpPr>
         <p:spPr>
           <a:xfrm>
-            <a:off x="457200" y="3962160"/>
-            <a:ext cx="2160" cy="2156760"/>
+            <a:off x="457200" y="3961800"/>
+            <a:ext cx="-12254040" cy="2156400"/>
           </a:xfrm>
           <a:prstGeom prst="rect">
             <a:avLst/>
@@ -592,7 +593,7 @@
         <p:spPr>
           <a:xfrm>
             <a:off x="457200" y="274680"/>
-            <a:ext cx="8225640" cy="1143000"/>
+            <a:ext cx="8224920" cy="1143000"/>
           </a:xfrm>
           <a:prstGeom prst="rect">
             <a:avLst/>
@@ -619,7 +620,7 @@
         <p:spPr>
           <a:xfrm>
             <a:off x="457200" y="1600200"/>
-            <a:ext cx="2160" cy="2156760"/>
+            <a:ext cx="-12254040" cy="2156400"/>
           </a:xfrm>
           <a:prstGeom prst="rect">
             <a:avLst/>
@@ -644,8 +645,8 @@
         </p:nvSpPr>
         <p:spPr>
           <a:xfrm>
-            <a:off x="459720" y="1600200"/>
-            <a:ext cx="2160" cy="2156760"/>
+            <a:off x="457200" y="1600200"/>
+            <a:ext cx="-12254040" cy="2156400"/>
           </a:xfrm>
           <a:prstGeom prst="rect">
             <a:avLst/>
@@ -715,7 +716,7 @@
         <p:spPr>
           <a:xfrm>
             <a:off x="457200" y="274680"/>
-            <a:ext cx="8225640" cy="1143000"/>
+            <a:ext cx="8224920" cy="1143000"/>
           </a:xfrm>
           <a:prstGeom prst="rect">
             <a:avLst/>
@@ -741,8 +742,8 @@
         </p:nvSpPr>
         <p:spPr>
           <a:xfrm>
-            <a:off x="457200" y="-12960"/>
-            <a:ext cx="5040" cy="7748280"/>
+            <a:off x="457200" y="-13320"/>
+            <a:ext cx="360" cy="7748280"/>
           </a:xfrm>
           <a:prstGeom prst="rect">
             <a:avLst/>
@@ -791,7 +792,7 @@
         <p:spPr>
           <a:xfrm>
             <a:off x="457200" y="274680"/>
-            <a:ext cx="8225640" cy="1143000"/>
+            <a:ext cx="8224920" cy="1143000"/>
           </a:xfrm>
           <a:prstGeom prst="rect">
             <a:avLst/>
@@ -818,7 +819,7 @@
         <p:spPr>
           <a:xfrm>
             <a:off x="457200" y="1600200"/>
-            <a:ext cx="5040" cy="4521960"/>
+            <a:ext cx="360" cy="4521240"/>
           </a:xfrm>
           <a:prstGeom prst="rect">
             <a:avLst/>
@@ -866,7 +867,7 @@
         <p:spPr>
           <a:xfrm>
             <a:off x="457200" y="274680"/>
-            <a:ext cx="8225640" cy="1143000"/>
+            <a:ext cx="8224920" cy="1143000"/>
           </a:xfrm>
           <a:prstGeom prst="rect">
             <a:avLst/>
@@ -893,7 +894,7 @@
         <p:spPr>
           <a:xfrm>
             <a:off x="457200" y="1600200"/>
-            <a:ext cx="2160" cy="4521960"/>
+            <a:ext cx="-12254040" cy="4521240"/>
           </a:xfrm>
           <a:prstGeom prst="rect">
             <a:avLst/>
@@ -918,8 +919,8 @@
         </p:nvSpPr>
         <p:spPr>
           <a:xfrm>
-            <a:off x="459720" y="1600200"/>
-            <a:ext cx="2160" cy="4521960"/>
+            <a:off x="457200" y="1600200"/>
+            <a:ext cx="-12254040" cy="4521240"/>
           </a:xfrm>
           <a:prstGeom prst="rect">
             <a:avLst/>
@@ -967,7 +968,7 @@
         <p:spPr>
           <a:xfrm>
             <a:off x="457200" y="274680"/>
-            <a:ext cx="8225640" cy="1143000"/>
+            <a:ext cx="8224920" cy="1143000"/>
           </a:xfrm>
           <a:prstGeom prst="rect">
             <a:avLst/>
@@ -1016,7 +1017,7 @@
         <p:spPr>
           <a:xfrm>
             <a:off x="457200" y="274680"/>
-            <a:ext cx="8225640" cy="5847480"/>
+            <a:ext cx="8224920" cy="5846760"/>
           </a:xfrm>
           <a:prstGeom prst="rect">
             <a:avLst/>
@@ -1065,7 +1066,7 @@
         <p:spPr>
           <a:xfrm>
             <a:off x="457200" y="274680"/>
-            <a:ext cx="8225640" cy="1143000"/>
+            <a:ext cx="8224920" cy="1143000"/>
           </a:xfrm>
           <a:prstGeom prst="rect">
             <a:avLst/>
@@ -1092,7 +1093,7 @@
         <p:spPr>
           <a:xfrm>
             <a:off x="457200" y="1600200"/>
-            <a:ext cx="2160" cy="2156760"/>
+            <a:ext cx="-12254040" cy="2156400"/>
           </a:xfrm>
           <a:prstGeom prst="rect">
             <a:avLst/>
@@ -1117,8 +1118,8 @@
         </p:nvSpPr>
         <p:spPr>
           <a:xfrm>
-            <a:off x="457200" y="3962160"/>
-            <a:ext cx="2160" cy="2156760"/>
+            <a:off x="457200" y="3961800"/>
+            <a:ext cx="-12254040" cy="2156400"/>
           </a:xfrm>
           <a:prstGeom prst="rect">
             <a:avLst/>
@@ -1143,8 +1144,8 @@
         </p:nvSpPr>
         <p:spPr>
           <a:xfrm>
-            <a:off x="459720" y="1600200"/>
-            <a:ext cx="2160" cy="4521960"/>
+            <a:off x="457200" y="1600200"/>
+            <a:ext cx="-12254040" cy="4521240"/>
           </a:xfrm>
           <a:prstGeom prst="rect">
             <a:avLst/>
@@ -1192,7 +1193,7 @@
         <p:spPr>
           <a:xfrm>
             <a:off x="457200" y="274680"/>
-            <a:ext cx="8225640" cy="1143000"/>
+            <a:ext cx="8224920" cy="1143000"/>
           </a:xfrm>
           <a:prstGeom prst="rect">
             <a:avLst/>
@@ -1218,8 +1219,8 @@
         </p:nvSpPr>
         <p:spPr>
           <a:xfrm>
-            <a:off x="457200" y="-12960"/>
-            <a:ext cx="5040" cy="7748280"/>
+            <a:off x="457200" y="-13320"/>
+            <a:ext cx="360" cy="7748280"/>
           </a:xfrm>
           <a:prstGeom prst="rect">
             <a:avLst/>
@@ -1268,7 +1269,7 @@
         <p:spPr>
           <a:xfrm>
             <a:off x="457200" y="274680"/>
-            <a:ext cx="8225640" cy="1143000"/>
+            <a:ext cx="8224920" cy="1143000"/>
           </a:xfrm>
           <a:prstGeom prst="rect">
             <a:avLst/>
@@ -1295,7 +1296,7 @@
         <p:spPr>
           <a:xfrm>
             <a:off x="457200" y="1600200"/>
-            <a:ext cx="2160" cy="4521960"/>
+            <a:ext cx="-12254040" cy="4521240"/>
           </a:xfrm>
           <a:prstGeom prst="rect">
             <a:avLst/>
@@ -1320,8 +1321,8 @@
         </p:nvSpPr>
         <p:spPr>
           <a:xfrm>
-            <a:off x="459720" y="1600200"/>
-            <a:ext cx="2160" cy="2156760"/>
+            <a:off x="457200" y="1600200"/>
+            <a:ext cx="-12254040" cy="2156400"/>
           </a:xfrm>
           <a:prstGeom prst="rect">
             <a:avLst/>
@@ -1346,8 +1347,8 @@
         </p:nvSpPr>
         <p:spPr>
           <a:xfrm>
-            <a:off x="459720" y="3962160"/>
-            <a:ext cx="2160" cy="2156760"/>
+            <a:off x="457200" y="3961800"/>
+            <a:ext cx="-12254040" cy="2156400"/>
           </a:xfrm>
           <a:prstGeom prst="rect">
             <a:avLst/>
@@ -1395,7 +1396,7 @@
         <p:spPr>
           <a:xfrm>
             <a:off x="457200" y="274680"/>
-            <a:ext cx="8225640" cy="1143000"/>
+            <a:ext cx="8224920" cy="1143000"/>
           </a:xfrm>
           <a:prstGeom prst="rect">
             <a:avLst/>
@@ -1422,7 +1423,7 @@
         <p:spPr>
           <a:xfrm>
             <a:off x="457200" y="1600200"/>
-            <a:ext cx="2160" cy="2156760"/>
+            <a:ext cx="-12254040" cy="2156400"/>
           </a:xfrm>
           <a:prstGeom prst="rect">
             <a:avLst/>
@@ -1447,8 +1448,8 @@
         </p:nvSpPr>
         <p:spPr>
           <a:xfrm>
-            <a:off x="459720" y="1600200"/>
-            <a:ext cx="2160" cy="2156760"/>
+            <a:off x="457200" y="1600200"/>
+            <a:ext cx="-12254040" cy="2156400"/>
           </a:xfrm>
           <a:prstGeom prst="rect">
             <a:avLst/>
@@ -1473,8 +1474,8 @@
         </p:nvSpPr>
         <p:spPr>
           <a:xfrm>
-            <a:off x="457200" y="3962160"/>
-            <a:ext cx="4680" cy="2156760"/>
+            <a:off x="457200" y="3961800"/>
+            <a:ext cx="-12254040" cy="2156400"/>
           </a:xfrm>
           <a:prstGeom prst="rect">
             <a:avLst/>
@@ -1522,7 +1523,7 @@
         <p:spPr>
           <a:xfrm>
             <a:off x="457200" y="274680"/>
-            <a:ext cx="8225640" cy="1143000"/>
+            <a:ext cx="8224920" cy="1143000"/>
           </a:xfrm>
           <a:prstGeom prst="rect">
             <a:avLst/>
@@ -1549,7 +1550,7 @@
         <p:spPr>
           <a:xfrm>
             <a:off x="457200" y="1600200"/>
-            <a:ext cx="5040" cy="2156760"/>
+            <a:ext cx="360" cy="2156400"/>
           </a:xfrm>
           <a:prstGeom prst="rect">
             <a:avLst/>
@@ -1574,8 +1575,8 @@
         </p:nvSpPr>
         <p:spPr>
           <a:xfrm>
-            <a:off x="457200" y="3962160"/>
-            <a:ext cx="5040" cy="2156760"/>
+            <a:off x="457200" y="3961800"/>
+            <a:ext cx="360" cy="2156400"/>
           </a:xfrm>
           <a:prstGeom prst="rect">
             <a:avLst/>
@@ -1623,7 +1624,7 @@
         <p:spPr>
           <a:xfrm>
             <a:off x="457200" y="274680"/>
-            <a:ext cx="8225640" cy="1143000"/>
+            <a:ext cx="8224920" cy="1143000"/>
           </a:xfrm>
           <a:prstGeom prst="rect">
             <a:avLst/>
@@ -1650,7 +1651,7 @@
         <p:spPr>
           <a:xfrm>
             <a:off x="457200" y="1600200"/>
-            <a:ext cx="2160" cy="2156760"/>
+            <a:ext cx="-12254040" cy="2156400"/>
           </a:xfrm>
           <a:prstGeom prst="rect">
             <a:avLst/>
@@ -1675,8 +1676,8 @@
         </p:nvSpPr>
         <p:spPr>
           <a:xfrm>
-            <a:off x="459720" y="1600200"/>
-            <a:ext cx="2160" cy="2156760"/>
+            <a:off x="457200" y="1600200"/>
+            <a:ext cx="-12254040" cy="2156400"/>
           </a:xfrm>
           <a:prstGeom prst="rect">
             <a:avLst/>
@@ -1701,8 +1702,8 @@
         </p:nvSpPr>
         <p:spPr>
           <a:xfrm>
-            <a:off x="459720" y="3962160"/>
-            <a:ext cx="2160" cy="2156760"/>
+            <a:off x="457200" y="3961800"/>
+            <a:ext cx="-12254040" cy="2156400"/>
           </a:xfrm>
           <a:prstGeom prst="rect">
             <a:avLst/>
@@ -1727,8 +1728,8 @@
         </p:nvSpPr>
         <p:spPr>
           <a:xfrm>
-            <a:off x="457200" y="3962160"/>
-            <a:ext cx="2160" cy="2156760"/>
+            <a:off x="457200" y="3961800"/>
+            <a:ext cx="-12254040" cy="2156400"/>
           </a:xfrm>
           <a:prstGeom prst="rect">
             <a:avLst/>
@@ -1776,7 +1777,7 @@
         <p:spPr>
           <a:xfrm>
             <a:off x="457200" y="274680"/>
-            <a:ext cx="8225640" cy="1143000"/>
+            <a:ext cx="8224920" cy="1143000"/>
           </a:xfrm>
           <a:prstGeom prst="rect">
             <a:avLst/>
@@ -1803,7 +1804,7 @@
         <p:spPr>
           <a:xfrm>
             <a:off x="457200" y="1600200"/>
-            <a:ext cx="2160" cy="2156760"/>
+            <a:ext cx="-12254040" cy="2156400"/>
           </a:xfrm>
           <a:prstGeom prst="rect">
             <a:avLst/>
@@ -1828,8 +1829,8 @@
         </p:nvSpPr>
         <p:spPr>
           <a:xfrm>
-            <a:off x="459720" y="1600200"/>
-            <a:ext cx="2160" cy="2156760"/>
+            <a:off x="457200" y="1600200"/>
+            <a:ext cx="-12254040" cy="2156400"/>
           </a:xfrm>
           <a:prstGeom prst="rect">
             <a:avLst/>
@@ -1899,7 +1900,7 @@
         <p:spPr>
           <a:xfrm>
             <a:off x="457200" y="274680"/>
-            <a:ext cx="8225640" cy="1143000"/>
+            <a:ext cx="8224920" cy="1143000"/>
           </a:xfrm>
           <a:prstGeom prst="rect">
             <a:avLst/>
@@ -1925,8 +1926,8 @@
         </p:nvSpPr>
         <p:spPr>
           <a:xfrm>
-            <a:off x="457200" y="-12960"/>
-            <a:ext cx="5040" cy="7748280"/>
+            <a:off x="457200" y="-13320"/>
+            <a:ext cx="360" cy="7748280"/>
           </a:xfrm>
           <a:prstGeom prst="rect">
             <a:avLst/>
@@ -1975,7 +1976,7 @@
         <p:spPr>
           <a:xfrm>
             <a:off x="457200" y="274680"/>
-            <a:ext cx="8225640" cy="1143000"/>
+            <a:ext cx="8224920" cy="1143000"/>
           </a:xfrm>
           <a:prstGeom prst="rect">
             <a:avLst/>
@@ -2002,7 +2003,7 @@
         <p:spPr>
           <a:xfrm>
             <a:off x="457200" y="1600200"/>
-            <a:ext cx="5040" cy="4521960"/>
+            <a:ext cx="360" cy="4521240"/>
           </a:xfrm>
           <a:prstGeom prst="rect">
             <a:avLst/>
@@ -2050,7 +2051,7 @@
         <p:spPr>
           <a:xfrm>
             <a:off x="457200" y="274680"/>
-            <a:ext cx="8225640" cy="1143000"/>
+            <a:ext cx="8224920" cy="1143000"/>
           </a:xfrm>
           <a:prstGeom prst="rect">
             <a:avLst/>
@@ -2077,7 +2078,7 @@
         <p:spPr>
           <a:xfrm>
             <a:off x="457200" y="1600200"/>
-            <a:ext cx="2160" cy="4521960"/>
+            <a:ext cx="-12254040" cy="4521240"/>
           </a:xfrm>
           <a:prstGeom prst="rect">
             <a:avLst/>
@@ -2102,8 +2103,8 @@
         </p:nvSpPr>
         <p:spPr>
           <a:xfrm>
-            <a:off x="459720" y="1600200"/>
-            <a:ext cx="2160" cy="4521960"/>
+            <a:off x="457200" y="1600200"/>
+            <a:ext cx="-12254040" cy="4521240"/>
           </a:xfrm>
           <a:prstGeom prst="rect">
             <a:avLst/>
@@ -2151,7 +2152,7 @@
         <p:spPr>
           <a:xfrm>
             <a:off x="457200" y="274680"/>
-            <a:ext cx="8225640" cy="1143000"/>
+            <a:ext cx="8224920" cy="1143000"/>
           </a:xfrm>
           <a:prstGeom prst="rect">
             <a:avLst/>
@@ -2200,7 +2201,7 @@
         <p:spPr>
           <a:xfrm>
             <a:off x="457200" y="274680"/>
-            <a:ext cx="8225640" cy="1143000"/>
+            <a:ext cx="8224920" cy="1143000"/>
           </a:xfrm>
           <a:prstGeom prst="rect">
             <a:avLst/>
@@ -2227,7 +2228,7 @@
         <p:spPr>
           <a:xfrm>
             <a:off x="457200" y="1600200"/>
-            <a:ext cx="5040" cy="4521960"/>
+            <a:ext cx="360" cy="4521240"/>
           </a:xfrm>
           <a:prstGeom prst="rect">
             <a:avLst/>
@@ -2275,7 +2276,7 @@
         <p:spPr>
           <a:xfrm>
             <a:off x="457200" y="274680"/>
-            <a:ext cx="8225640" cy="5847480"/>
+            <a:ext cx="8224920" cy="5846760"/>
           </a:xfrm>
           <a:prstGeom prst="rect">
             <a:avLst/>
@@ -2324,7 +2325,7 @@
         <p:spPr>
           <a:xfrm>
             <a:off x="457200" y="274680"/>
-            <a:ext cx="8225640" cy="1143000"/>
+            <a:ext cx="8224920" cy="1143000"/>
           </a:xfrm>
           <a:prstGeom prst="rect">
             <a:avLst/>
@@ -2351,7 +2352,7 @@
         <p:spPr>
           <a:xfrm>
             <a:off x="457200" y="1600200"/>
-            <a:ext cx="2160" cy="2156760"/>
+            <a:ext cx="-12254040" cy="2156400"/>
           </a:xfrm>
           <a:prstGeom prst="rect">
             <a:avLst/>
@@ -2376,8 +2377,8 @@
         </p:nvSpPr>
         <p:spPr>
           <a:xfrm>
-            <a:off x="457200" y="3962160"/>
-            <a:ext cx="2160" cy="2156760"/>
+            <a:off x="457200" y="3961800"/>
+            <a:ext cx="-12254040" cy="2156400"/>
           </a:xfrm>
           <a:prstGeom prst="rect">
             <a:avLst/>
@@ -2402,8 +2403,8 @@
         </p:nvSpPr>
         <p:spPr>
           <a:xfrm>
-            <a:off x="459720" y="1600200"/>
-            <a:ext cx="2160" cy="4521960"/>
+            <a:off x="457200" y="1600200"/>
+            <a:ext cx="-12254040" cy="4521240"/>
           </a:xfrm>
           <a:prstGeom prst="rect">
             <a:avLst/>
@@ -2451,7 +2452,7 @@
         <p:spPr>
           <a:xfrm>
             <a:off x="457200" y="274680"/>
-            <a:ext cx="8225640" cy="1143000"/>
+            <a:ext cx="8224920" cy="1143000"/>
           </a:xfrm>
           <a:prstGeom prst="rect">
             <a:avLst/>
@@ -2478,7 +2479,7 @@
         <p:spPr>
           <a:xfrm>
             <a:off x="457200" y="1600200"/>
-            <a:ext cx="2160" cy="4521960"/>
+            <a:ext cx="-12254040" cy="4521240"/>
           </a:xfrm>
           <a:prstGeom prst="rect">
             <a:avLst/>
@@ -2503,8 +2504,8 @@
         </p:nvSpPr>
         <p:spPr>
           <a:xfrm>
-            <a:off x="459720" y="1600200"/>
-            <a:ext cx="2160" cy="2156760"/>
+            <a:off x="457200" y="1600200"/>
+            <a:ext cx="-12254040" cy="2156400"/>
           </a:xfrm>
           <a:prstGeom prst="rect">
             <a:avLst/>
@@ -2529,8 +2530,8 @@
         </p:nvSpPr>
         <p:spPr>
           <a:xfrm>
-            <a:off x="459720" y="3962160"/>
-            <a:ext cx="2160" cy="2156760"/>
+            <a:off x="457200" y="3961800"/>
+            <a:ext cx="-12254040" cy="2156400"/>
           </a:xfrm>
           <a:prstGeom prst="rect">
             <a:avLst/>
@@ -2578,7 +2579,7 @@
         <p:spPr>
           <a:xfrm>
             <a:off x="457200" y="274680"/>
-            <a:ext cx="8225640" cy="1143000"/>
+            <a:ext cx="8224920" cy="1143000"/>
           </a:xfrm>
           <a:prstGeom prst="rect">
             <a:avLst/>
@@ -2605,7 +2606,7 @@
         <p:spPr>
           <a:xfrm>
             <a:off x="457200" y="1600200"/>
-            <a:ext cx="2160" cy="2156760"/>
+            <a:ext cx="-12254040" cy="2156400"/>
           </a:xfrm>
           <a:prstGeom prst="rect">
             <a:avLst/>
@@ -2630,8 +2631,8 @@
         </p:nvSpPr>
         <p:spPr>
           <a:xfrm>
-            <a:off x="459720" y="1600200"/>
-            <a:ext cx="2160" cy="2156760"/>
+            <a:off x="457200" y="1600200"/>
+            <a:ext cx="-12254040" cy="2156400"/>
           </a:xfrm>
           <a:prstGeom prst="rect">
             <a:avLst/>
@@ -2656,8 +2657,8 @@
         </p:nvSpPr>
         <p:spPr>
           <a:xfrm>
-            <a:off x="457200" y="3962160"/>
-            <a:ext cx="4680" cy="2156760"/>
+            <a:off x="457200" y="3961800"/>
+            <a:ext cx="-12254040" cy="2156400"/>
           </a:xfrm>
           <a:prstGeom prst="rect">
             <a:avLst/>
@@ -2705,7 +2706,7 @@
         <p:spPr>
           <a:xfrm>
             <a:off x="457200" y="274680"/>
-            <a:ext cx="8225640" cy="1143000"/>
+            <a:ext cx="8224920" cy="1143000"/>
           </a:xfrm>
           <a:prstGeom prst="rect">
             <a:avLst/>
@@ -2732,7 +2733,7 @@
         <p:spPr>
           <a:xfrm>
             <a:off x="457200" y="1600200"/>
-            <a:ext cx="5040" cy="2156760"/>
+            <a:ext cx="360" cy="2156400"/>
           </a:xfrm>
           <a:prstGeom prst="rect">
             <a:avLst/>
@@ -2757,8 +2758,8 @@
         </p:nvSpPr>
         <p:spPr>
           <a:xfrm>
-            <a:off x="457200" y="3962160"/>
-            <a:ext cx="5040" cy="2156760"/>
+            <a:off x="457200" y="3961800"/>
+            <a:ext cx="360" cy="2156400"/>
           </a:xfrm>
           <a:prstGeom prst="rect">
             <a:avLst/>
@@ -2806,7 +2807,7 @@
         <p:spPr>
           <a:xfrm>
             <a:off x="457200" y="274680"/>
-            <a:ext cx="8225640" cy="1143000"/>
+            <a:ext cx="8224920" cy="1143000"/>
           </a:xfrm>
           <a:prstGeom prst="rect">
             <a:avLst/>
@@ -2833,7 +2834,7 @@
         <p:spPr>
           <a:xfrm>
             <a:off x="457200" y="1600200"/>
-            <a:ext cx="2160" cy="2156760"/>
+            <a:ext cx="-12254040" cy="2156400"/>
           </a:xfrm>
           <a:prstGeom prst="rect">
             <a:avLst/>
@@ -2858,8 +2859,8 @@
         </p:nvSpPr>
         <p:spPr>
           <a:xfrm>
-            <a:off x="459720" y="1600200"/>
-            <a:ext cx="2160" cy="2156760"/>
+            <a:off x="457200" y="1600200"/>
+            <a:ext cx="-12254040" cy="2156400"/>
           </a:xfrm>
           <a:prstGeom prst="rect">
             <a:avLst/>
@@ -2884,8 +2885,8 @@
         </p:nvSpPr>
         <p:spPr>
           <a:xfrm>
-            <a:off x="459720" y="3962160"/>
-            <a:ext cx="2160" cy="2156760"/>
+            <a:off x="457200" y="3961800"/>
+            <a:ext cx="-12254040" cy="2156400"/>
           </a:xfrm>
           <a:prstGeom prst="rect">
             <a:avLst/>
@@ -2910,8 +2911,8 @@
         </p:nvSpPr>
         <p:spPr>
           <a:xfrm>
-            <a:off x="457200" y="3962160"/>
-            <a:ext cx="2160" cy="2156760"/>
+            <a:off x="457200" y="3961800"/>
+            <a:ext cx="-12254040" cy="2156400"/>
           </a:xfrm>
           <a:prstGeom prst="rect">
             <a:avLst/>
@@ -2959,7 +2960,7 @@
         <p:spPr>
           <a:xfrm>
             <a:off x="457200" y="274680"/>
-            <a:ext cx="8225640" cy="1143000"/>
+            <a:ext cx="8224920" cy="1143000"/>
           </a:xfrm>
           <a:prstGeom prst="rect">
             <a:avLst/>
@@ -2986,7 +2987,7 @@
         <p:spPr>
           <a:xfrm>
             <a:off x="457200" y="1600200"/>
-            <a:ext cx="2160" cy="2156760"/>
+            <a:ext cx="-12254040" cy="2156400"/>
           </a:xfrm>
           <a:prstGeom prst="rect">
             <a:avLst/>
@@ -3011,8 +3012,8 @@
         </p:nvSpPr>
         <p:spPr>
           <a:xfrm>
-            <a:off x="459720" y="1600200"/>
-            <a:ext cx="2160" cy="2156760"/>
+            <a:off x="457200" y="1600200"/>
+            <a:ext cx="-12254040" cy="2156400"/>
           </a:xfrm>
           <a:prstGeom prst="rect">
             <a:avLst/>
@@ -3060,7 +3061,7 @@
         <p:spPr>
           <a:xfrm>
             <a:off x="457200" y="274680"/>
-            <a:ext cx="8225640" cy="1143000"/>
+            <a:ext cx="8224920" cy="1143000"/>
           </a:xfrm>
           <a:prstGeom prst="rect">
             <a:avLst/>
@@ -3087,7 +3088,7 @@
         <p:spPr>
           <a:xfrm>
             <a:off x="457200" y="1600200"/>
-            <a:ext cx="2160" cy="4521960"/>
+            <a:ext cx="-12254040" cy="4521240"/>
           </a:xfrm>
           <a:prstGeom prst="rect">
             <a:avLst/>
@@ -3112,8 +3113,8 @@
         </p:nvSpPr>
         <p:spPr>
           <a:xfrm>
-            <a:off x="459720" y="1600200"/>
-            <a:ext cx="2160" cy="4521960"/>
+            <a:off x="457200" y="1600200"/>
+            <a:ext cx="-12254040" cy="4521240"/>
           </a:xfrm>
           <a:prstGeom prst="rect">
             <a:avLst/>
@@ -3161,7 +3162,7 @@
         <p:spPr>
           <a:xfrm>
             <a:off x="457200" y="274680"/>
-            <a:ext cx="8225640" cy="1143000"/>
+            <a:ext cx="8224920" cy="1143000"/>
           </a:xfrm>
           <a:prstGeom prst="rect">
             <a:avLst/>
@@ -3210,7 +3211,7 @@
         <p:spPr>
           <a:xfrm>
             <a:off x="457200" y="274680"/>
-            <a:ext cx="8225640" cy="5847480"/>
+            <a:ext cx="8224920" cy="5846760"/>
           </a:xfrm>
           <a:prstGeom prst="rect">
             <a:avLst/>
@@ -3259,7 +3260,7 @@
         <p:spPr>
           <a:xfrm>
             <a:off x="457200" y="274680"/>
-            <a:ext cx="8225640" cy="1143000"/>
+            <a:ext cx="8224920" cy="1143000"/>
           </a:xfrm>
           <a:prstGeom prst="rect">
             <a:avLst/>
@@ -3286,7 +3287,7 @@
         <p:spPr>
           <a:xfrm>
             <a:off x="457200" y="1600200"/>
-            <a:ext cx="2160" cy="2156760"/>
+            <a:ext cx="-12254040" cy="2156400"/>
           </a:xfrm>
           <a:prstGeom prst="rect">
             <a:avLst/>
@@ -3311,8 +3312,8 @@
         </p:nvSpPr>
         <p:spPr>
           <a:xfrm>
-            <a:off x="457200" y="3962160"/>
-            <a:ext cx="2160" cy="2156760"/>
+            <a:off x="457200" y="3961800"/>
+            <a:ext cx="-12254040" cy="2156400"/>
           </a:xfrm>
           <a:prstGeom prst="rect">
             <a:avLst/>
@@ -3337,8 +3338,8 @@
         </p:nvSpPr>
         <p:spPr>
           <a:xfrm>
-            <a:off x="459720" y="1600200"/>
-            <a:ext cx="2160" cy="4521960"/>
+            <a:off x="457200" y="1600200"/>
+            <a:ext cx="-12254040" cy="4521240"/>
           </a:xfrm>
           <a:prstGeom prst="rect">
             <a:avLst/>
@@ -3386,7 +3387,7 @@
         <p:spPr>
           <a:xfrm>
             <a:off x="457200" y="274680"/>
-            <a:ext cx="8225640" cy="1143000"/>
+            <a:ext cx="8224920" cy="1143000"/>
           </a:xfrm>
           <a:prstGeom prst="rect">
             <a:avLst/>
@@ -3413,7 +3414,7 @@
         <p:spPr>
           <a:xfrm>
             <a:off x="457200" y="1600200"/>
-            <a:ext cx="2160" cy="4521960"/>
+            <a:ext cx="-12254040" cy="4521240"/>
           </a:xfrm>
           <a:prstGeom prst="rect">
             <a:avLst/>
@@ -3438,8 +3439,8 @@
         </p:nvSpPr>
         <p:spPr>
           <a:xfrm>
-            <a:off x="459720" y="1600200"/>
-            <a:ext cx="2160" cy="2156760"/>
+            <a:off x="457200" y="1600200"/>
+            <a:ext cx="-12254040" cy="2156400"/>
           </a:xfrm>
           <a:prstGeom prst="rect">
             <a:avLst/>
@@ -3464,8 +3465,8 @@
         </p:nvSpPr>
         <p:spPr>
           <a:xfrm>
-            <a:off x="459720" y="3962160"/>
-            <a:ext cx="2160" cy="2156760"/>
+            <a:off x="457200" y="3961800"/>
+            <a:ext cx="-12254040" cy="2156400"/>
           </a:xfrm>
           <a:prstGeom prst="rect">
             <a:avLst/>
@@ -3513,7 +3514,7 @@
         <p:spPr>
           <a:xfrm>
             <a:off x="457200" y="274680"/>
-            <a:ext cx="8225640" cy="1143000"/>
+            <a:ext cx="8224920" cy="1143000"/>
           </a:xfrm>
           <a:prstGeom prst="rect">
             <a:avLst/>
@@ -3540,7 +3541,7 @@
         <p:spPr>
           <a:xfrm>
             <a:off x="457200" y="1600200"/>
-            <a:ext cx="2160" cy="2156760"/>
+            <a:ext cx="-12254040" cy="2156400"/>
           </a:xfrm>
           <a:prstGeom prst="rect">
             <a:avLst/>
@@ -3565,8 +3566,8 @@
         </p:nvSpPr>
         <p:spPr>
           <a:xfrm>
-            <a:off x="459720" y="1600200"/>
-            <a:ext cx="2160" cy="2156760"/>
+            <a:off x="457200" y="1600200"/>
+            <a:ext cx="-12254040" cy="2156400"/>
           </a:xfrm>
           <a:prstGeom prst="rect">
             <a:avLst/>
@@ -3591,8 +3592,8 @@
         </p:nvSpPr>
         <p:spPr>
           <a:xfrm>
-            <a:off x="457200" y="3962160"/>
-            <a:ext cx="4680" cy="2156760"/>
+            <a:off x="457200" y="3961800"/>
+            <a:ext cx="-12254040" cy="2156400"/>
           </a:xfrm>
           <a:prstGeom prst="rect">
             <a:avLst/>
@@ -3829,7 +3830,7 @@
         <p:spPr>
           <a:xfrm>
             <a:off x="457200" y="274680"/>
-            <a:ext cx="8225640" cy="1142640"/>
+            <a:ext cx="8224920" cy="1142640"/>
           </a:xfrm>
           <a:prstGeom prst="rect">
             <a:avLst/>
@@ -3864,7 +3865,7 @@
         <p:spPr>
           <a:xfrm>
             <a:off x="457200" y="1600200"/>
-            <a:ext cx="5040" cy="4521960"/>
+            <a:ext cx="360" cy="4521240"/>
           </a:xfrm>
           <a:prstGeom prst="rect">
             <a:avLst/>
@@ -3965,8 +3966,8 @@
         </p:nvSpPr>
         <p:spPr>
           <a:xfrm>
-            <a:off x="462960" y="1600200"/>
-            <a:ext cx="5040" cy="4521960"/>
+            <a:off x="457920" y="1600200"/>
+            <a:ext cx="360" cy="4521240"/>
           </a:xfrm>
           <a:prstGeom prst="rect">
             <a:avLst/>
@@ -4283,7 +4284,7 @@
         <p:spPr>
           <a:xfrm>
             <a:off x="685800" y="2130480"/>
-            <a:ext cx="7768440" cy="1465920"/>
+            <a:ext cx="7767720" cy="1465200"/>
           </a:xfrm>
           <a:prstGeom prst="rect">
             <a:avLst/>
@@ -4319,7 +4320,7 @@
         <p:spPr>
           <a:xfrm>
             <a:off x="1371600" y="3886200"/>
-            <a:ext cx="6396840" cy="1748520"/>
+            <a:ext cx="6396120" cy="1747800"/>
           </a:xfrm>
           <a:prstGeom prst="rect">
             <a:avLst/>
@@ -4386,7 +4387,7 @@
         <p:spPr>
           <a:xfrm>
             <a:off x="457560" y="275040"/>
-            <a:ext cx="8225640" cy="1139040"/>
+            <a:ext cx="8224920" cy="1138320"/>
           </a:xfrm>
           <a:prstGeom prst="rect">
             <a:avLst/>
@@ -4422,7 +4423,7 @@
         <p:spPr>
           <a:xfrm>
             <a:off x="1225440" y="1850760"/>
-            <a:ext cx="3485160" cy="3524760"/>
+            <a:ext cx="3484440" cy="3524040"/>
           </a:xfrm>
           <a:prstGeom prst="rect">
             <a:avLst/>
@@ -4499,7 +4500,7 @@
         <p:spPr>
           <a:xfrm>
             <a:off x="5249160" y="1955520"/>
-            <a:ext cx="2667240" cy="3965760"/>
+            <a:ext cx="2666520" cy="3965040"/>
           </a:xfrm>
           <a:prstGeom prst="rect">
             <a:avLst/>
@@ -4566,7 +4567,7 @@
         <p:spPr>
           <a:xfrm>
             <a:off x="457200" y="274680"/>
-            <a:ext cx="8225640" cy="1139040"/>
+            <a:ext cx="8224920" cy="1138320"/>
           </a:xfrm>
           <a:prstGeom prst="rect">
             <a:avLst/>
@@ -4582,7 +4583,7 @@
         <p:spPr>
           <a:xfrm>
             <a:off x="1188720" y="1600560"/>
-            <a:ext cx="6763320" cy="4521960"/>
+            <a:ext cx="6762600" cy="4521240"/>
           </a:xfrm>
           <a:prstGeom prst="rect">
             <a:avLst/>
@@ -4598,7 +4599,7 @@
         <p:spPr>
           <a:xfrm>
             <a:off x="457200" y="275040"/>
-            <a:ext cx="8225640" cy="1139040"/>
+            <a:ext cx="8224920" cy="1138320"/>
           </a:xfrm>
           <a:prstGeom prst="rect">
             <a:avLst/>
@@ -4634,7 +4635,7 @@
         <p:spPr>
           <a:xfrm>
             <a:off x="1332720" y="1211040"/>
-            <a:ext cx="6763320" cy="1113120"/>
+            <a:ext cx="6762600" cy="1112400"/>
           </a:xfrm>
           <a:prstGeom prst="rect">
             <a:avLst/>
@@ -4734,7 +4735,7 @@
         <p:spPr>
           <a:xfrm>
             <a:off x="2266560" y="2880360"/>
-            <a:ext cx="4425120" cy="2614320"/>
+            <a:ext cx="4424400" cy="2613600"/>
           </a:xfrm>
           <a:prstGeom prst="rect">
             <a:avLst/>
@@ -4801,7 +4802,7 @@
         <p:spPr>
           <a:xfrm>
             <a:off x="1097280" y="1920240"/>
-            <a:ext cx="7129080" cy="3745800"/>
+            <a:ext cx="7128360" cy="3745080"/>
           </a:xfrm>
           <a:prstGeom prst="rect">
             <a:avLst/>
@@ -4881,7 +4882,7 @@
         <p:spPr>
           <a:xfrm>
             <a:off x="457920" y="275040"/>
-            <a:ext cx="8225640" cy="1139040"/>
+            <a:ext cx="8224920" cy="1138320"/>
           </a:xfrm>
           <a:prstGeom prst="rect">
             <a:avLst/>
@@ -4968,7 +4969,7 @@
         <p:spPr>
           <a:xfrm>
             <a:off x="457200" y="1524240"/>
-            <a:ext cx="8226360" cy="3745800"/>
+            <a:ext cx="8225640" cy="3745080"/>
           </a:xfrm>
           <a:prstGeom prst="rect">
             <a:avLst/>
@@ -5108,7 +5109,7 @@
         <p:spPr>
           <a:xfrm>
             <a:off x="457920" y="275400"/>
-            <a:ext cx="8225640" cy="1139040"/>
+            <a:ext cx="8224920" cy="1138320"/>
           </a:xfrm>
           <a:prstGeom prst="rect">
             <a:avLst/>
@@ -5201,7 +5202,7 @@
         <p:spPr>
           <a:xfrm>
             <a:off x="444600" y="1366920"/>
-            <a:ext cx="8199000" cy="5126400"/>
+            <a:ext cx="8198280" cy="5125680"/>
           </a:xfrm>
           <a:prstGeom prst="rect">
             <a:avLst/>
@@ -5217,7 +5218,7 @@
         <p:spPr>
           <a:xfrm>
             <a:off x="458280" y="275400"/>
-            <a:ext cx="8225640" cy="1139040"/>
+            <a:ext cx="8224920" cy="1138320"/>
           </a:xfrm>
           <a:prstGeom prst="rect">
             <a:avLst/>
@@ -5253,6 +5254,141 @@
           <p:childTnLst>
             <p:seq>
               <p:cTn id="12" nodeType="mainSeq">
+                <p:childTnLst/>
+              </p:cTn>
+              <p:prevCondLst>
+                <p:cond delay="0" evt="onPrev">
+                  <p:tgtEl>
+                    <p:sldTgt/>
+                  </p:tgtEl>
+                </p:cond>
+              </p:prevCondLst>
+              <p:nextCondLst>
+                <p:cond delay="0" evt="onNext">
+                  <p:tgtEl>
+                    <p:sldTgt/>
+                  </p:tgtEl>
+                </p:cond>
+              </p:nextCondLst>
+            </p:seq>
+          </p:childTnLst>
+        </p:cTn>
+      </p:par>
+    </p:tnLst>
+  </p:timing>
+</p:sld>
+</file>
+
+<file path=ppt/slides/slide7.xml><?xml version="1.0" encoding="utf-8"?>
+<p:sld xmlns:a="http://schemas.openxmlformats.org/drawingml/2006/main" xmlns:p="http://schemas.openxmlformats.org/presentationml/2006/main" xmlns:r="http://schemas.openxmlformats.org/officeDocument/2006/relationships">
+  <p:cSld>
+    <p:spTree>
+      <p:nvGrpSpPr>
+        <p:cNvPr id="1" name=""/>
+        <p:cNvGrpSpPr/>
+        <p:nvPr/>
+      </p:nvGrpSpPr>
+      <p:grpSpPr>
+        <a:xfrm>
+          <a:off x="0" y="0"/>
+          <a:ext cx="0" cy="0"/>
+          <a:chOff x="0" y="0"/>
+          <a:chExt cx="0" cy="0"/>
+        </a:xfrm>
+      </p:grpSpPr>
+      <p:pic>
+        <p:nvPicPr>
+          <p:cNvPr descr="" id="124" name=""/>
+          <p:cNvPicPr/>
+          <p:nvPr/>
+        </p:nvPicPr>
+        <p:blipFill>
+          <a:blip r:embed="rId1"/>
+          <a:stretch>
+            <a:fillRect/>
+          </a:stretch>
+        </p:blipFill>
+        <p:spPr>
+          <a:xfrm>
+            <a:off x="1672200" y="1280160"/>
+            <a:ext cx="5623200" cy="4626360"/>
+          </a:xfrm>
+          <a:prstGeom prst="rect">
+            <a:avLst/>
+          </a:prstGeom>
+        </p:spPr>
+      </p:pic>
+      <p:sp>
+        <p:nvSpPr>
+          <p:cNvPr id="125" name="CustomShape 1"/>
+          <p:cNvSpPr/>
+          <p:nvPr/>
+        </p:nvSpPr>
+        <p:spPr>
+          <a:xfrm>
+            <a:off x="2501280" y="6007680"/>
+            <a:ext cx="4240440" cy="345960"/>
+          </a:xfrm>
+          <a:prstGeom prst="rect">
+            <a:avLst/>
+          </a:prstGeom>
+        </p:spPr>
+        <p:txBody>
+          <a:bodyPr bIns="45000" lIns="90000" rIns="90000" tIns="45000" wrap="none"/>
+          <a:p>
+            <a:r>
+              <a:rPr lang="en-US"/>
+              <a:t>http://192.168.7.41:8080/u/rutger/w/map</a:t>
+            </a:r>
+            <a:endParaRPr/>
+          </a:p>
+        </p:txBody>
+      </p:sp>
+      <p:sp>
+        <p:nvSpPr>
+          <p:cNvPr id="126" name="CustomShape 2"/>
+          <p:cNvSpPr/>
+          <p:nvPr/>
+        </p:nvSpPr>
+        <p:spPr>
+          <a:xfrm>
+            <a:off x="458640" y="275400"/>
+            <a:ext cx="8224920" cy="1138320"/>
+          </a:xfrm>
+          <a:prstGeom prst="rect">
+            <a:avLst/>
+          </a:prstGeom>
+        </p:spPr>
+        <p:txBody>
+          <a:bodyPr anchor="ctr" bIns="45000" lIns="90000" rIns="90000" tIns="45000"/>
+          <a:p>
+            <a:pPr algn="ctr">
+              <a:lnSpc>
+                <a:spcPct val="100000"/>
+              </a:lnSpc>
+            </a:pPr>
+            <a:r>
+              <a:rPr lang="en-US" sz="4400">
+                <a:solidFill>
+                  <a:srgbClr val="000000"/>
+                </a:solidFill>
+                <a:latin typeface="Calibri"/>
+              </a:rPr>
+              <a:t>Workflow sharing</a:t>
+            </a:r>
+            <a:endParaRPr/>
+          </a:p>
+        </p:txBody>
+      </p:sp>
+    </p:spTree>
+  </p:cSld>
+  <p:timing>
+    <p:tnLst>
+      <p:par>
+        <p:cTn dur="indefinite" id="13" nodeType="tmRoot" restart="never">
+          <p:childTnLst>
+            <p:seq>
+              <p:cTn id="14" nodeType="mainSeq">
                 <p:childTnLst/>
               </p:cTn>
               <p:prevCondLst>

</xml_diff>